<commit_message>
continue with the new request
</commit_message>
<xml_diff>
--- a/PHP_Process_Data_From_MySQL/beam_analysis/requirements_25022016/spec.pptx
+++ b/PHP_Process_Data_From_MySQL/beam_analysis/requirements_25022016/spec.pptx
@@ -296,7 +296,7 @@
             <a:fld id="{1D8BD707-D9CF-40AE-B4C6-C98DA3205C09}" type="datetimeFigureOut">
               <a:rPr lang="en-US" smtClean="0"/>
               <a:pPr/>
-              <a:t>2/24/2016</a:t>
+              <a:t>3/5/2016</a:t>
             </a:fld>
             <a:endParaRPr lang="en-US"/>
           </a:p>
@@ -463,7 +463,7 @@
             <a:fld id="{1D8BD707-D9CF-40AE-B4C6-C98DA3205C09}" type="datetimeFigureOut">
               <a:rPr lang="en-US" smtClean="0"/>
               <a:pPr/>
-              <a:t>2/24/2016</a:t>
+              <a:t>3/5/2016</a:t>
             </a:fld>
             <a:endParaRPr lang="en-US"/>
           </a:p>
@@ -640,7 +640,7 @@
             <a:fld id="{1D8BD707-D9CF-40AE-B4C6-C98DA3205C09}" type="datetimeFigureOut">
               <a:rPr lang="en-US" smtClean="0"/>
               <a:pPr/>
-              <a:t>2/24/2016</a:t>
+              <a:t>3/5/2016</a:t>
             </a:fld>
             <a:endParaRPr lang="en-US"/>
           </a:p>
@@ -807,7 +807,7 @@
             <a:fld id="{1D8BD707-D9CF-40AE-B4C6-C98DA3205C09}" type="datetimeFigureOut">
               <a:rPr lang="en-US" smtClean="0"/>
               <a:pPr/>
-              <a:t>2/24/2016</a:t>
+              <a:t>3/5/2016</a:t>
             </a:fld>
             <a:endParaRPr lang="en-US"/>
           </a:p>
@@ -1050,7 +1050,7 @@
             <a:fld id="{1D8BD707-D9CF-40AE-B4C6-C98DA3205C09}" type="datetimeFigureOut">
               <a:rPr lang="en-US" smtClean="0"/>
               <a:pPr/>
-              <a:t>2/24/2016</a:t>
+              <a:t>3/5/2016</a:t>
             </a:fld>
             <a:endParaRPr lang="en-US"/>
           </a:p>
@@ -1335,7 +1335,7 @@
             <a:fld id="{1D8BD707-D9CF-40AE-B4C6-C98DA3205C09}" type="datetimeFigureOut">
               <a:rPr lang="en-US" smtClean="0"/>
               <a:pPr/>
-              <a:t>2/24/2016</a:t>
+              <a:t>3/5/2016</a:t>
             </a:fld>
             <a:endParaRPr lang="en-US"/>
           </a:p>
@@ -1754,7 +1754,7 @@
             <a:fld id="{1D8BD707-D9CF-40AE-B4C6-C98DA3205C09}" type="datetimeFigureOut">
               <a:rPr lang="en-US" smtClean="0"/>
               <a:pPr/>
-              <a:t>2/24/2016</a:t>
+              <a:t>3/5/2016</a:t>
             </a:fld>
             <a:endParaRPr lang="en-US"/>
           </a:p>
@@ -1869,7 +1869,7 @@
             <a:fld id="{1D8BD707-D9CF-40AE-B4C6-C98DA3205C09}" type="datetimeFigureOut">
               <a:rPr lang="en-US" smtClean="0"/>
               <a:pPr/>
-              <a:t>2/24/2016</a:t>
+              <a:t>3/5/2016</a:t>
             </a:fld>
             <a:endParaRPr lang="en-US"/>
           </a:p>
@@ -1961,7 +1961,7 @@
             <a:fld id="{1D8BD707-D9CF-40AE-B4C6-C98DA3205C09}" type="datetimeFigureOut">
               <a:rPr lang="en-US" smtClean="0"/>
               <a:pPr/>
-              <a:t>2/24/2016</a:t>
+              <a:t>3/5/2016</a:t>
             </a:fld>
             <a:endParaRPr lang="en-US"/>
           </a:p>
@@ -2235,7 +2235,7 @@
             <a:fld id="{1D8BD707-D9CF-40AE-B4C6-C98DA3205C09}" type="datetimeFigureOut">
               <a:rPr lang="en-US" smtClean="0"/>
               <a:pPr/>
-              <a:t>2/24/2016</a:t>
+              <a:t>3/5/2016</a:t>
             </a:fld>
             <a:endParaRPr lang="en-US"/>
           </a:p>
@@ -2485,7 +2485,7 @@
             <a:fld id="{1D8BD707-D9CF-40AE-B4C6-C98DA3205C09}" type="datetimeFigureOut">
               <a:rPr lang="en-US" smtClean="0"/>
               <a:pPr/>
-              <a:t>2/24/2016</a:t>
+              <a:t>3/5/2016</a:t>
             </a:fld>
             <a:endParaRPr lang="en-US"/>
           </a:p>
@@ -2695,7 +2695,7 @@
             <a:fld id="{1D8BD707-D9CF-40AE-B4C6-C98DA3205C09}" type="datetimeFigureOut">
               <a:rPr lang="en-US" smtClean="0"/>
               <a:pPr/>
-              <a:t>2/24/2016</a:t>
+              <a:t>3/5/2016</a:t>
             </a:fld>
             <a:endParaRPr lang="en-US"/>
           </a:p>
@@ -3163,60 +3163,95 @@
               <a:rPr lang="en-US" dirty="0" smtClean="0"/>
               <a:t>See db_changes.xlsx db table changes.</a:t>
             </a:r>
-            <a:endParaRPr lang="en-US" dirty="0" smtClean="0"/>
-          </a:p>
-          <a:p>
+          </a:p>
+          <a:p>
+            <a:r>
+              <a:rPr lang="en-US" dirty="0" smtClean="0">
+                <a:solidFill>
+                  <a:srgbClr val="00B050"/>
+                </a:solidFill>
+              </a:rPr>
+              <a:t>Move all db query to </a:t>
+            </a:r>
+            <a:r>
+              <a:rPr lang="en-US" dirty="0" err="1" smtClean="0">
+                <a:solidFill>
+                  <a:srgbClr val="00B050"/>
+                </a:solidFill>
+              </a:rPr>
+              <a:t>Database.class.php</a:t>
+            </a:r>
+            <a:r>
+              <a:rPr lang="en-US" dirty="0" smtClean="0">
+                <a:solidFill>
+                  <a:srgbClr val="00B050"/>
+                </a:solidFill>
+              </a:rPr>
+              <a:t>:</a:t>
+            </a:r>
+          </a:p>
+          <a:p>
+            <a:pPr>
+              <a:buNone/>
+            </a:pPr>
             <a:r>
               <a:rPr lang="en-US" dirty="0" smtClean="0"/>
-              <a:t>Move </a:t>
-            </a:r>
-            <a:r>
-              <a:rPr lang="en-US" dirty="0" smtClean="0"/>
-              <a:t>all db query to </a:t>
-            </a:r>
-            <a:r>
-              <a:rPr lang="en-US" dirty="0" err="1" smtClean="0"/>
-              <a:t>Database.class.php</a:t>
-            </a:r>
-            <a:r>
-              <a:rPr lang="en-US" dirty="0" smtClean="0"/>
-              <a:t>:</a:t>
-            </a:r>
-          </a:p>
-          <a:p>
-            <a:pPr>
-              <a:buNone/>
-            </a:pPr>
-            <a:r>
-              <a:rPr lang="en-US" dirty="0" smtClean="0"/>
-              <a:t>	Placing </a:t>
-            </a:r>
-            <a:r>
-              <a:rPr lang="en-US" dirty="0" smtClean="0"/>
-              <a:t>“$query = "SELECT `E` FROM `</a:t>
-            </a:r>
-            <a:r>
-              <a:rPr lang="en-US" dirty="0" err="1" smtClean="0"/>
+              <a:t>	</a:t>
+            </a:r>
+            <a:r>
+              <a:rPr lang="en-US" dirty="0" smtClean="0">
+                <a:solidFill>
+                  <a:srgbClr val="00B050"/>
+                </a:solidFill>
+              </a:rPr>
+              <a:t>Placing “$query = "SELECT `E` FROM `</a:t>
+            </a:r>
+            <a:r>
+              <a:rPr lang="en-US" dirty="0" err="1" smtClean="0">
+                <a:solidFill>
+                  <a:srgbClr val="00B050"/>
+                </a:solidFill>
+              </a:rPr>
               <a:t>ba_mat</a:t>
             </a:r>
             <a:r>
-              <a:rPr lang="en-US" dirty="0" smtClean="0"/>
+              <a:rPr lang="en-US" dirty="0" smtClean="0">
+                <a:solidFill>
+                  <a:srgbClr val="00B050"/>
+                </a:solidFill>
+              </a:rPr>
               <a:t>` WHERE `</a:t>
             </a:r>
             <a:r>
-              <a:rPr lang="en-US" dirty="0" err="1" smtClean="0"/>
+              <a:rPr lang="en-US" dirty="0" err="1" smtClean="0">
+                <a:solidFill>
+                  <a:srgbClr val="00B050"/>
+                </a:solidFill>
+              </a:rPr>
               <a:t>rcdNo</a:t>
             </a:r>
             <a:r>
-              <a:rPr lang="en-US" dirty="0" smtClean="0"/>
+              <a:rPr lang="en-US" dirty="0" smtClean="0">
+                <a:solidFill>
+                  <a:srgbClr val="00B050"/>
+                </a:solidFill>
+              </a:rPr>
               <a:t>`=";” in public function generateKE_1() in </a:t>
             </a:r>
             <a:r>
-              <a:rPr lang="en-US" dirty="0" err="1" smtClean="0"/>
+              <a:rPr lang="en-US" dirty="0" err="1" smtClean="0">
+                <a:solidFill>
+                  <a:srgbClr val="00B050"/>
+                </a:solidFill>
+              </a:rPr>
               <a:t>FEA.class.php</a:t>
             </a:r>
             <a:r>
-              <a:rPr lang="en-US" dirty="0" smtClean="0"/>
+              <a:rPr lang="en-US" dirty="0" smtClean="0">
+                <a:solidFill>
+                  <a:srgbClr val="00B050"/>
+                </a:solidFill>
+              </a:rPr>
               <a:t> is not good</a:t>
             </a:r>
           </a:p>
@@ -3288,103 +3323,192 @@
           <a:lstStyle/>
           <a:p>
             <a:r>
-              <a:rPr lang="en-US" dirty="0" smtClean="0"/>
+              <a:rPr lang="en-US" dirty="0" smtClean="0">
+                <a:solidFill>
+                  <a:srgbClr val="00B050"/>
+                </a:solidFill>
+              </a:rPr>
               <a:t>Two db tables added: </a:t>
             </a:r>
             <a:r>
-              <a:rPr lang="en-US" dirty="0" err="1" smtClean="0"/>
+              <a:rPr lang="en-US" dirty="0" err="1" smtClean="0">
+                <a:solidFill>
+                  <a:srgbClr val="00B050"/>
+                </a:solidFill>
+              </a:rPr>
               <a:t>ba_nodes</a:t>
             </a:r>
             <a:r>
-              <a:rPr lang="en-US" dirty="0" smtClean="0"/>
+              <a:rPr lang="en-US" dirty="0" smtClean="0">
+                <a:solidFill>
+                  <a:srgbClr val="00B050"/>
+                </a:solidFill>
+              </a:rPr>
               <a:t>, </a:t>
             </a:r>
             <a:r>
-              <a:rPr lang="en-US" dirty="0" err="1" smtClean="0"/>
+              <a:rPr lang="en-US" dirty="0" err="1" smtClean="0">
+                <a:solidFill>
+                  <a:srgbClr val="00B050"/>
+                </a:solidFill>
+              </a:rPr>
               <a:t>ba_lcs</a:t>
             </a:r>
             <a:r>
-              <a:rPr lang="en-US" dirty="0" smtClean="0"/>
+              <a:rPr lang="en-US" dirty="0" smtClean="0">
+                <a:solidFill>
+                  <a:srgbClr val="00B050"/>
+                </a:solidFill>
+              </a:rPr>
               <a:t> where </a:t>
             </a:r>
             <a:r>
-              <a:rPr lang="en-US" dirty="0" err="1" smtClean="0"/>
+              <a:rPr lang="en-US" dirty="0" err="1" smtClean="0">
+                <a:solidFill>
+                  <a:srgbClr val="00B050"/>
+                </a:solidFill>
+              </a:rPr>
               <a:t>ba_nodes</a:t>
             </a:r>
             <a:r>
-              <a:rPr lang="en-US" dirty="0" smtClean="0"/>
+              <a:rPr lang="en-US" dirty="0" smtClean="0">
+                <a:solidFill>
+                  <a:srgbClr val="00B050"/>
+                </a:solidFill>
+              </a:rPr>
               <a:t> records the coordinates of a set of nodes; </a:t>
             </a:r>
             <a:r>
-              <a:rPr lang="en-US" dirty="0" err="1" smtClean="0"/>
+              <a:rPr lang="en-US" dirty="0" err="1" smtClean="0">
+                <a:solidFill>
+                  <a:srgbClr val="00B050"/>
+                </a:solidFill>
+              </a:rPr>
               <a:t>ba_lcs</a:t>
             </a:r>
             <a:r>
-              <a:rPr lang="en-US" dirty="0" smtClean="0"/>
+              <a:rPr lang="en-US" dirty="0" smtClean="0">
+                <a:solidFill>
+                  <a:srgbClr val="00B050"/>
+                </a:solidFill>
+              </a:rPr>
               <a:t> records the combinations of </a:t>
             </a:r>
             <a:r>
-              <a:rPr lang="en-US" dirty="0" err="1" smtClean="0"/>
+              <a:rPr lang="en-US" dirty="0" err="1" smtClean="0">
+                <a:solidFill>
+                  <a:srgbClr val="00B050"/>
+                </a:solidFill>
+              </a:rPr>
               <a:t>ilcs</a:t>
             </a:r>
             <a:r>
-              <a:rPr lang="en-US" dirty="0" smtClean="0"/>
+              <a:rPr lang="en-US" dirty="0" smtClean="0">
+                <a:solidFill>
+                  <a:srgbClr val="00B050"/>
+                </a:solidFill>
+              </a:rPr>
               <a:t> saved in </a:t>
             </a:r>
             <a:r>
-              <a:rPr lang="en-US" dirty="0" err="1" smtClean="0"/>
+              <a:rPr lang="en-US" dirty="0" err="1" smtClean="0">
+                <a:solidFill>
+                  <a:srgbClr val="00B050"/>
+                </a:solidFill>
+              </a:rPr>
               <a:t>ba_ilcs</a:t>
             </a:r>
             <a:r>
-              <a:rPr lang="en-US" dirty="0" smtClean="0"/>
+              <a:rPr lang="en-US" dirty="0" smtClean="0">
+                <a:solidFill>
+                  <a:srgbClr val="00B050"/>
+                </a:solidFill>
+              </a:rPr>
               <a:t> by assigning each </a:t>
             </a:r>
             <a:r>
-              <a:rPr lang="en-US" dirty="0" err="1" smtClean="0"/>
+              <a:rPr lang="en-US" dirty="0" err="1" smtClean="0">
+                <a:solidFill>
+                  <a:srgbClr val="00B050"/>
+                </a:solidFill>
+              </a:rPr>
               <a:t>ilcs</a:t>
             </a:r>
             <a:r>
-              <a:rPr lang="en-US" dirty="0" smtClean="0"/>
+              <a:rPr lang="en-US" dirty="0" smtClean="0">
+                <a:solidFill>
+                  <a:srgbClr val="00B050"/>
+                </a:solidFill>
+              </a:rPr>
               <a:t> a coefficient in the </a:t>
             </a:r>
             <a:r>
-              <a:rPr lang="en-US" dirty="0" err="1" smtClean="0"/>
+              <a:rPr lang="en-US" dirty="0" err="1" smtClean="0">
+                <a:solidFill>
+                  <a:srgbClr val="00B050"/>
+                </a:solidFill>
+              </a:rPr>
               <a:t>lcs</a:t>
             </a:r>
             <a:r>
-              <a:rPr lang="en-US" dirty="0" smtClean="0"/>
+              <a:rPr lang="en-US" dirty="0" smtClean="0">
+                <a:solidFill>
+                  <a:srgbClr val="00B050"/>
+                </a:solidFill>
+              </a:rPr>
               <a:t>.</a:t>
             </a:r>
           </a:p>
           <a:p>
             <a:r>
-              <a:rPr lang="en-US" dirty="0" smtClean="0"/>
+              <a:rPr lang="en-US" dirty="0" smtClean="0">
+                <a:solidFill>
+                  <a:srgbClr val="00B050"/>
+                </a:solidFill>
+              </a:rPr>
               <a:t>DB tables renamed:</a:t>
             </a:r>
           </a:p>
           <a:p>
             <a:pPr lvl="1"/>
             <a:r>
-              <a:rPr lang="en-US" dirty="0" err="1" smtClean="0"/>
+              <a:rPr lang="en-US" dirty="0" err="1" smtClean="0">
+                <a:solidFill>
+                  <a:srgbClr val="00B050"/>
+                </a:solidFill>
+              </a:rPr>
               <a:t>ba_g</a:t>
             </a:r>
             <a:r>
-              <a:rPr lang="en-US" dirty="0" smtClean="0"/>
+              <a:rPr lang="en-US" dirty="0" smtClean="0">
+                <a:solidFill>
+                  <a:srgbClr val="00B050"/>
+                </a:solidFill>
+              </a:rPr>
               <a:t> </a:t>
             </a:r>
             <a:r>
               <a:rPr lang="en-US" dirty="0" smtClean="0">
+                <a:solidFill>
+                  <a:srgbClr val="00B050"/>
+                </a:solidFill>
                 <a:sym typeface="Wingdings" pitchFamily="2" charset="2"/>
               </a:rPr>
               <a:t> </a:t>
             </a:r>
             <a:r>
               <a:rPr lang="en-US" dirty="0" err="1" smtClean="0">
+                <a:solidFill>
+                  <a:srgbClr val="00B050"/>
+                </a:solidFill>
                 <a:sym typeface="Wingdings" pitchFamily="2" charset="2"/>
               </a:rPr>
               <a:t>ba_sections</a:t>
             </a:r>
             <a:endParaRPr lang="en-US" dirty="0" smtClean="0">
+              <a:solidFill>
+                <a:srgbClr val="00B050"/>
+              </a:solidFill>
               <a:sym typeface="Wingdings" pitchFamily="2" charset="2"/>
             </a:endParaRPr>
           </a:p>
@@ -3392,23 +3516,35 @@
             <a:pPr lvl="1"/>
             <a:r>
               <a:rPr lang="en-US" dirty="0" err="1" smtClean="0">
+                <a:solidFill>
+                  <a:srgbClr val="00B050"/>
+                </a:solidFill>
                 <a:sym typeface="Wingdings" pitchFamily="2" charset="2"/>
               </a:rPr>
               <a:t>ba_loading</a:t>
             </a:r>
             <a:r>
               <a:rPr lang="en-US" dirty="0" smtClean="0">
+                <a:solidFill>
+                  <a:srgbClr val="00B050"/>
+                </a:solidFill>
                 <a:sym typeface="Wingdings" pitchFamily="2" charset="2"/>
               </a:rPr>
               <a:t>  </a:t>
             </a:r>
             <a:r>
               <a:rPr lang="en-US" dirty="0" err="1" smtClean="0">
+                <a:solidFill>
+                  <a:srgbClr val="00B050"/>
+                </a:solidFill>
                 <a:sym typeface="Wingdings" pitchFamily="2" charset="2"/>
               </a:rPr>
               <a:t>ba_ilcs</a:t>
             </a:r>
             <a:endParaRPr lang="en-US" dirty="0" smtClean="0">
+              <a:solidFill>
+                <a:srgbClr val="00B050"/>
+              </a:solidFill>
               <a:sym typeface="Wingdings" pitchFamily="2" charset="2"/>
             </a:endParaRPr>
           </a:p>
@@ -3416,23 +3552,35 @@
             <a:pPr lvl="1"/>
             <a:r>
               <a:rPr lang="en-US" dirty="0" err="1" smtClean="0">
+                <a:solidFill>
+                  <a:srgbClr val="00B050"/>
+                </a:solidFill>
                 <a:sym typeface="Wingdings" pitchFamily="2" charset="2"/>
               </a:rPr>
               <a:t>ba_mat</a:t>
             </a:r>
             <a:r>
               <a:rPr lang="en-US" dirty="0" smtClean="0">
+                <a:solidFill>
+                  <a:srgbClr val="00B050"/>
+                </a:solidFill>
                 <a:sym typeface="Wingdings" pitchFamily="2" charset="2"/>
               </a:rPr>
               <a:t>  </a:t>
             </a:r>
             <a:r>
               <a:rPr lang="en-US" dirty="0" err="1" smtClean="0">
+                <a:solidFill>
+                  <a:srgbClr val="00B050"/>
+                </a:solidFill>
                 <a:sym typeface="Wingdings" pitchFamily="2" charset="2"/>
               </a:rPr>
               <a:t>ba_materials</a:t>
             </a:r>
             <a:endParaRPr lang="en-US" dirty="0" smtClean="0">
+              <a:solidFill>
+                <a:srgbClr val="00B050"/>
+              </a:solidFill>
               <a:sym typeface="Wingdings" pitchFamily="2" charset="2"/>
             </a:endParaRPr>
           </a:p>
@@ -3440,23 +3588,36 @@
             <a:pPr lvl="1"/>
             <a:r>
               <a:rPr lang="en-US" dirty="0" err="1" smtClean="0">
+                <a:solidFill>
+                  <a:srgbClr val="00B050"/>
+                </a:solidFill>
                 <a:sym typeface="Wingdings" pitchFamily="2" charset="2"/>
               </a:rPr>
               <a:t>ba_spt</a:t>
             </a:r>
             <a:r>
               <a:rPr lang="en-US" dirty="0" smtClean="0">
+                <a:solidFill>
+                  <a:srgbClr val="00B050"/>
+                </a:solidFill>
                 <a:sym typeface="Wingdings" pitchFamily="2" charset="2"/>
               </a:rPr>
               <a:t>  </a:t>
             </a:r>
             <a:r>
               <a:rPr lang="en-US" dirty="0" err="1" smtClean="0">
+                <a:solidFill>
+                  <a:srgbClr val="00B050"/>
+                </a:solidFill>
                 <a:sym typeface="Wingdings" pitchFamily="2" charset="2"/>
               </a:rPr>
               <a:t>ba_supports</a:t>
             </a:r>
-            <a:endParaRPr lang="en-US" dirty="0"/>
+            <a:endParaRPr lang="en-US" dirty="0">
+              <a:solidFill>
+                <a:srgbClr val="00B050"/>
+              </a:solidFill>
+            </a:endParaRPr>
           </a:p>
         </p:txBody>
       </p:sp>
@@ -3501,50 +3662,138 @@
           <a:lstStyle/>
           <a:p>
             <a:r>
-              <a:rPr lang="en-US" dirty="0" smtClean="0"/>
+              <a:rPr lang="en-US" dirty="0" smtClean="0">
+                <a:solidFill>
+                  <a:srgbClr val="00B050"/>
+                </a:solidFill>
+              </a:rPr>
               <a:t>According to the given node number [</a:t>
             </a:r>
             <a:r>
-              <a:rPr lang="en-US" dirty="0" err="1" smtClean="0"/>
+              <a:rPr lang="en-US" dirty="0" err="1" smtClean="0">
+                <a:solidFill>
+                  <a:srgbClr val="00B050"/>
+                </a:solidFill>
+              </a:rPr>
               <a:t>n_start</a:t>
             </a:r>
             <a:r>
-              <a:rPr lang="en-US" dirty="0" smtClean="0"/>
+              <a:rPr lang="en-US" dirty="0" smtClean="0">
+                <a:solidFill>
+                  <a:srgbClr val="00B050"/>
+                </a:solidFill>
+              </a:rPr>
               <a:t>] and [</a:t>
             </a:r>
             <a:r>
-              <a:rPr lang="en-US" dirty="0" err="1" smtClean="0"/>
+              <a:rPr lang="en-US" dirty="0" err="1" smtClean="0">
+                <a:solidFill>
+                  <a:srgbClr val="00B050"/>
+                </a:solidFill>
+              </a:rPr>
               <a:t>n_end</a:t>
             </a:r>
             <a:r>
-              <a:rPr lang="en-US" dirty="0" smtClean="0"/>
+              <a:rPr lang="en-US" dirty="0" smtClean="0">
+                <a:solidFill>
+                  <a:srgbClr val="00B050"/>
+                </a:solidFill>
+              </a:rPr>
               <a:t>] in table “</a:t>
             </a:r>
             <a:r>
-              <a:rPr lang="en-US" dirty="0" err="1" smtClean="0"/>
+              <a:rPr lang="en-US" dirty="0" err="1" smtClean="0">
+                <a:solidFill>
+                  <a:srgbClr val="00B050"/>
+                </a:solidFill>
+              </a:rPr>
               <a:t>ba_sections</a:t>
             </a:r>
             <a:r>
-              <a:rPr lang="en-US" dirty="0" smtClean="0"/>
+              <a:rPr lang="en-US" dirty="0" smtClean="0">
+                <a:solidFill>
+                  <a:srgbClr val="00B050"/>
+                </a:solidFill>
+              </a:rPr>
               <a:t>”, retrieve the corresponding coordinate values from table “</a:t>
             </a:r>
             <a:r>
-              <a:rPr lang="en-US" dirty="0" err="1" smtClean="0"/>
+              <a:rPr lang="en-US" dirty="0" err="1" smtClean="0">
+                <a:solidFill>
+                  <a:srgbClr val="00B050"/>
+                </a:solidFill>
+              </a:rPr>
               <a:t>ba_nodes</a:t>
             </a:r>
             <a:r>
-              <a:rPr lang="en-US" dirty="0" smtClean="0"/>
+              <a:rPr lang="en-US" dirty="0" smtClean="0">
+                <a:solidFill>
+                  <a:srgbClr val="00B050"/>
+                </a:solidFill>
+              </a:rPr>
               <a:t>” (currently, the coordinate values are given in [start] and [end] in “</a:t>
             </a:r>
             <a:r>
-              <a:rPr lang="en-US" dirty="0" err="1" smtClean="0"/>
+              <a:rPr lang="en-US" dirty="0" err="1" smtClean="0">
+                <a:solidFill>
+                  <a:srgbClr val="00B050"/>
+                </a:solidFill>
+              </a:rPr>
               <a:t>ba_g</a:t>
             </a:r>
             <a:r>
-              <a:rPr lang="en-US" dirty="0" smtClean="0"/>
+              <a:rPr lang="en-US" dirty="0" smtClean="0">
+                <a:solidFill>
+                  <a:srgbClr val="00B050"/>
+                </a:solidFill>
+              </a:rPr>
               <a:t>”).</a:t>
             </a:r>
-            <a:endParaRPr lang="en-US" dirty="0"/>
+          </a:p>
+          <a:p>
+            <a:pPr>
+              <a:buNone/>
+            </a:pPr>
+            <a:r>
+              <a:rPr lang="en-US" sz="2000" dirty="0" smtClean="0">
+                <a:solidFill>
+                  <a:srgbClr val="FF0000"/>
+                </a:solidFill>
+              </a:rPr>
+              <a:t>This  one is reprogrammed in getting hard nodes from geometry data  (previously </a:t>
+            </a:r>
+            <a:r>
+              <a:rPr lang="en-US" sz="2000" dirty="0" err="1" smtClean="0">
+                <a:solidFill>
+                  <a:srgbClr val="FF0000"/>
+                </a:solidFill>
+              </a:rPr>
+              <a:t>ba_g</a:t>
+            </a:r>
+            <a:r>
+              <a:rPr lang="en-US" sz="2000" dirty="0" smtClean="0">
+                <a:solidFill>
+                  <a:srgbClr val="FF0000"/>
+                </a:solidFill>
+              </a:rPr>
+              <a:t>, now changed to </a:t>
+            </a:r>
+            <a:r>
+              <a:rPr lang="en-US" sz="2000" dirty="0" err="1" smtClean="0">
+                <a:solidFill>
+                  <a:srgbClr val="FF0000"/>
+                </a:solidFill>
+              </a:rPr>
+              <a:t>ba_sections</a:t>
+            </a:r>
+            <a:r>
+              <a:rPr lang="en-US" sz="2000" dirty="0" smtClean="0">
+                <a:solidFill>
+                  <a:srgbClr val="FF0000"/>
+                </a:solidFill>
+              </a:rPr>
+              <a:t>)</a:t>
+            </a:r>
           </a:p>
         </p:txBody>
       </p:sp>
@@ -3585,7 +3834,9 @@
         </p:nvSpPr>
         <p:spPr/>
         <p:txBody>
-          <a:bodyPr/>
+          <a:bodyPr>
+            <a:normAutofit lnSpcReduction="10000"/>
+          </a:bodyPr>
           <a:lstStyle/>
           <a:p>
             <a:r>
@@ -3658,8 +3909,30 @@
             </a:r>
             <a:r>
               <a:rPr lang="en-US" dirty="0" smtClean="0"/>
-              <a:t>, …”</a:t>
-            </a:r>
+              <a:t>, </a:t>
+            </a:r>
+            <a:r>
+              <a:rPr lang="en-US" dirty="0" smtClean="0"/>
+              <a:t>…”</a:t>
+            </a:r>
+          </a:p>
+          <a:p>
+            <a:pPr>
+              <a:buNone/>
+            </a:pPr>
+            <a:r>
+              <a:rPr lang="en-US" sz="2000" dirty="0" smtClean="0">
+                <a:solidFill>
+                  <a:srgbClr val="FF0000"/>
+                </a:solidFill>
+              </a:rPr>
+              <a:t>Please send me the unitConversion.php</a:t>
+            </a:r>
+            <a:endParaRPr lang="en-US" sz="2000" dirty="0" smtClean="0">
+              <a:solidFill>
+                <a:srgbClr val="FF0000"/>
+              </a:solidFill>
+            </a:endParaRPr>
           </a:p>
         </p:txBody>
       </p:sp>
@@ -3700,7 +3973,9 @@
         </p:nvSpPr>
         <p:spPr/>
         <p:txBody>
-          <a:bodyPr/>
+          <a:bodyPr>
+            <a:normAutofit fontScale="92500" lnSpcReduction="10000"/>
+          </a:bodyPr>
           <a:lstStyle/>
           <a:p>
             <a:r>
@@ -3729,13 +4004,34 @@
             </a:r>
             <a:r>
               <a:rPr lang="en-US" dirty="0" smtClean="0"/>
-              <a:t> calculation.</a:t>
-            </a:r>
-          </a:p>
-          <a:p>
+              <a:t> calculation</a:t>
+            </a:r>
             <a:r>
               <a:rPr lang="en-US" dirty="0" smtClean="0"/>
-              <a:t>Perform the “</a:t>
+              <a:t>.</a:t>
+            </a:r>
+          </a:p>
+          <a:p>
+            <a:pPr>
+              <a:buNone/>
+            </a:pPr>
+            <a:r>
+              <a:rPr lang="en-US" sz="2000" dirty="0" smtClean="0">
+                <a:solidFill>
+                  <a:srgbClr val="FF0000"/>
+                </a:solidFill>
+              </a:rPr>
+              <a:t>in generateKE_1() function, the variables needed to calculate $le are $E, $I, and $le; there is no $A, so is there another formulae involved, or we simply don’t have $A in scope.</a:t>
+            </a:r>
+          </a:p>
+          <a:p>
+            <a:r>
+              <a:rPr lang="en-US" dirty="0" smtClean="0"/>
+              <a:t>Perform </a:t>
+            </a:r>
+            <a:r>
+              <a:rPr lang="en-US" dirty="0" smtClean="0"/>
+              <a:t>the “</a:t>
             </a:r>
             <a:r>
               <a:rPr lang="en-US" dirty="0" err="1" smtClean="0"/>
@@ -3791,7 +4087,11 @@
             </a:r>
             <a:r>
               <a:rPr lang="en-US" dirty="0" smtClean="0"/>
-              <a:t> and </a:t>
+              <a:t> </a:t>
+            </a:r>
+            <a:r>
+              <a:rPr lang="en-US" dirty="0" smtClean="0"/>
+              <a:t>and </a:t>
             </a:r>
             <a:r>
               <a:rPr lang="en-US" dirty="0" err="1" smtClean="0"/>
@@ -3809,6 +4109,62 @@
               <a:rPr lang="en-US" dirty="0" smtClean="0"/>
               <a:t> file. </a:t>
             </a:r>
+            <a:endParaRPr lang="en-US" dirty="0" smtClean="0"/>
+          </a:p>
+          <a:p>
+            <a:pPr>
+              <a:buNone/>
+            </a:pPr>
+            <a:r>
+              <a:rPr lang="en-US" sz="2200" dirty="0" err="1" smtClean="0">
+                <a:solidFill>
+                  <a:srgbClr val="FF0000"/>
+                </a:solidFill>
+              </a:rPr>
+              <a:t>K_e</a:t>
+            </a:r>
+            <a:r>
+              <a:rPr lang="en-US" sz="2200" dirty="0" smtClean="0">
+                <a:solidFill>
+                  <a:srgbClr val="FF0000"/>
+                </a:solidFill>
+              </a:rPr>
+              <a:t> calculation currently calculate for the whole beam (i.e. every data that is related to an </a:t>
+            </a:r>
+            <a:r>
+              <a:rPr lang="en-US" sz="2200" dirty="0" err="1" smtClean="0">
+                <a:solidFill>
+                  <a:srgbClr val="FF0000"/>
+                </a:solidFill>
+              </a:rPr>
+              <a:t>userscalcPK</a:t>
+            </a:r>
+            <a:r>
+              <a:rPr lang="en-US" sz="2200" dirty="0" smtClean="0">
+                <a:solidFill>
+                  <a:srgbClr val="FF0000"/>
+                </a:solidFill>
+              </a:rPr>
+              <a:t>), please let me know if you want to change it to calculate just a section record in </a:t>
+            </a:r>
+            <a:r>
+              <a:rPr lang="en-US" sz="2200" dirty="0" err="1" smtClean="0">
+                <a:solidFill>
+                  <a:srgbClr val="FF0000"/>
+                </a:solidFill>
+              </a:rPr>
+              <a:t>ba_sections</a:t>
+            </a:r>
+            <a:endParaRPr lang="en-US" sz="2200" dirty="0" smtClean="0">
+              <a:solidFill>
+                <a:srgbClr val="FF0000"/>
+              </a:solidFill>
+            </a:endParaRPr>
+          </a:p>
+          <a:p>
+            <a:pPr>
+              <a:buNone/>
+            </a:pPr>
             <a:endParaRPr lang="en-US" dirty="0"/>
           </a:p>
         </p:txBody>
@@ -3856,20 +4212,32 @@
         </p:spPr>
         <p:txBody>
           <a:bodyPr>
-            <a:normAutofit/>
+            <a:normAutofit lnSpcReduction="10000"/>
           </a:bodyPr>
           <a:lstStyle/>
           <a:p>
             <a:r>
-              <a:rPr lang="en-US" dirty="0" smtClean="0"/>
+              <a:rPr lang="en-US" dirty="0" smtClean="0">
+                <a:solidFill>
+                  <a:srgbClr val="00B050"/>
+                </a:solidFill>
+              </a:rPr>
               <a:t>The mesh is still the same – using all </a:t>
             </a:r>
             <a:r>
-              <a:rPr lang="en-US" dirty="0" err="1" smtClean="0"/>
+              <a:rPr lang="en-US" dirty="0" err="1" smtClean="0">
+                <a:solidFill>
+                  <a:srgbClr val="00B050"/>
+                </a:solidFill>
+              </a:rPr>
               <a:t>ilc</a:t>
             </a:r>
             <a:r>
-              <a:rPr lang="en-US" dirty="0" smtClean="0"/>
+              <a:rPr lang="en-US" dirty="0" smtClean="0">
+                <a:solidFill>
+                  <a:srgbClr val="00B050"/>
+                </a:solidFill>
+              </a:rPr>
               <a:t> and others to determine hard nodes, etc.</a:t>
             </a:r>
           </a:p>
@@ -3906,135 +4274,359 @@
           <a:p>
             <a:pPr lvl="1"/>
             <a:r>
-              <a:rPr lang="en-US" dirty="0" smtClean="0"/>
+              <a:rPr lang="en-US" dirty="0" smtClean="0">
+                <a:solidFill>
+                  <a:srgbClr val="00B050"/>
+                </a:solidFill>
+              </a:rPr>
               <a:t>Nodes: id, x, y, z</a:t>
             </a:r>
           </a:p>
           <a:p>
             <a:pPr lvl="1"/>
             <a:r>
-              <a:rPr lang="en-US" dirty="0" smtClean="0"/>
+              <a:rPr lang="en-US" dirty="0" smtClean="0">
+                <a:solidFill>
+                  <a:srgbClr val="00B050"/>
+                </a:solidFill>
+              </a:rPr>
               <a:t>Elements, id, </a:t>
             </a:r>
             <a:r>
-              <a:rPr lang="en-US" dirty="0" err="1" smtClean="0"/>
+              <a:rPr lang="en-US" dirty="0" err="1" smtClean="0">
+                <a:solidFill>
+                  <a:srgbClr val="00B050"/>
+                </a:solidFill>
+              </a:rPr>
               <a:t>n_start</a:t>
             </a:r>
             <a:r>
-              <a:rPr lang="en-US" dirty="0" smtClean="0"/>
+              <a:rPr lang="en-US" dirty="0" smtClean="0">
+                <a:solidFill>
+                  <a:srgbClr val="00B050"/>
+                </a:solidFill>
+              </a:rPr>
               <a:t>, </a:t>
             </a:r>
             <a:r>
-              <a:rPr lang="en-US" dirty="0" err="1" smtClean="0"/>
+              <a:rPr lang="en-US" dirty="0" err="1" smtClean="0">
+                <a:solidFill>
+                  <a:srgbClr val="00B050"/>
+                </a:solidFill>
+              </a:rPr>
               <a:t>n_end</a:t>
             </a:r>
             <a:r>
-              <a:rPr lang="en-US" dirty="0" smtClean="0"/>
+              <a:rPr lang="en-US" dirty="0" smtClean="0">
+                <a:solidFill>
+                  <a:srgbClr val="00B050"/>
+                </a:solidFill>
+              </a:rPr>
               <a:t>, E, Rho, G, A, Ix, </a:t>
             </a:r>
             <a:r>
-              <a:rPr lang="en-US" dirty="0" err="1" smtClean="0"/>
+              <a:rPr lang="en-US" dirty="0" err="1" smtClean="0">
+                <a:solidFill>
+                  <a:srgbClr val="00B050"/>
+                </a:solidFill>
+              </a:rPr>
               <a:t>Iy</a:t>
             </a:r>
-            <a:endParaRPr lang="en-US" dirty="0" smtClean="0"/>
+            <a:endParaRPr lang="en-US" dirty="0" smtClean="0">
+              <a:solidFill>
+                <a:srgbClr val="00B050"/>
+              </a:solidFill>
+            </a:endParaRPr>
           </a:p>
           <a:p>
             <a:pPr lvl="1"/>
             <a:r>
-              <a:rPr lang="en-US" dirty="0" err="1" smtClean="0"/>
+              <a:rPr lang="en-US" dirty="0" err="1" smtClean="0">
+                <a:solidFill>
+                  <a:srgbClr val="00B050"/>
+                </a:solidFill>
+              </a:rPr>
               <a:t>ilc</a:t>
             </a:r>
             <a:r>
-              <a:rPr lang="en-US" dirty="0" smtClean="0"/>
+              <a:rPr lang="en-US" dirty="0" smtClean="0">
+                <a:solidFill>
+                  <a:srgbClr val="00B050"/>
+                </a:solidFill>
+              </a:rPr>
               <a:t>:  </a:t>
             </a:r>
             <a:r>
-              <a:rPr lang="en-US" dirty="0" err="1" smtClean="0"/>
+              <a:rPr lang="en-US" dirty="0" err="1" smtClean="0">
+                <a:solidFill>
+                  <a:srgbClr val="00B050"/>
+                </a:solidFill>
+              </a:rPr>
               <a:t>node_id</a:t>
             </a:r>
             <a:r>
-              <a:rPr lang="en-US" dirty="0" smtClean="0"/>
+              <a:rPr lang="en-US" dirty="0" smtClean="0">
+                <a:solidFill>
+                  <a:srgbClr val="00B050"/>
+                </a:solidFill>
+              </a:rPr>
               <a:t>, </a:t>
             </a:r>
             <a:r>
-              <a:rPr lang="en-US" dirty="0" err="1" smtClean="0"/>
+              <a:rPr lang="en-US" dirty="0" err="1" smtClean="0">
+                <a:solidFill>
+                  <a:srgbClr val="00B050"/>
+                </a:solidFill>
+              </a:rPr>
               <a:t>fx</a:t>
             </a:r>
             <a:r>
-              <a:rPr lang="en-US" dirty="0" smtClean="0"/>
+              <a:rPr lang="en-US" dirty="0" smtClean="0">
+                <a:solidFill>
+                  <a:srgbClr val="00B050"/>
+                </a:solidFill>
+              </a:rPr>
               <a:t>, </a:t>
             </a:r>
             <a:r>
-              <a:rPr lang="en-US" dirty="0" err="1" smtClean="0"/>
+              <a:rPr lang="en-US" dirty="0" err="1" smtClean="0">
+                <a:solidFill>
+                  <a:srgbClr val="00B050"/>
+                </a:solidFill>
+              </a:rPr>
               <a:t>fy</a:t>
             </a:r>
             <a:r>
-              <a:rPr lang="en-US" dirty="0" smtClean="0"/>
+              <a:rPr lang="en-US" dirty="0" smtClean="0">
+                <a:solidFill>
+                  <a:srgbClr val="00B050"/>
+                </a:solidFill>
+              </a:rPr>
               <a:t>, </a:t>
             </a:r>
             <a:r>
-              <a:rPr lang="en-US" dirty="0" err="1" smtClean="0"/>
+              <a:rPr lang="en-US" dirty="0" err="1" smtClean="0">
+                <a:solidFill>
+                  <a:srgbClr val="00B050"/>
+                </a:solidFill>
+              </a:rPr>
               <a:t>fz</a:t>
             </a:r>
             <a:r>
-              <a:rPr lang="en-US" dirty="0" smtClean="0"/>
+              <a:rPr lang="en-US" dirty="0" smtClean="0">
+                <a:solidFill>
+                  <a:srgbClr val="00B050"/>
+                </a:solidFill>
+              </a:rPr>
               <a:t>, </a:t>
             </a:r>
             <a:r>
-              <a:rPr lang="en-US" dirty="0" err="1" smtClean="0"/>
+              <a:rPr lang="en-US" dirty="0" err="1" smtClean="0">
+                <a:solidFill>
+                  <a:srgbClr val="00B050"/>
+                </a:solidFill>
+              </a:rPr>
               <a:t>mx</a:t>
             </a:r>
             <a:r>
-              <a:rPr lang="en-US" dirty="0" smtClean="0"/>
+              <a:rPr lang="en-US" dirty="0" smtClean="0">
+                <a:solidFill>
+                  <a:srgbClr val="00B050"/>
+                </a:solidFill>
+              </a:rPr>
               <a:t>, my, </a:t>
             </a:r>
             <a:r>
-              <a:rPr lang="en-US" dirty="0" err="1" smtClean="0"/>
+              <a:rPr lang="en-US" dirty="0" err="1" smtClean="0">
+                <a:solidFill>
+                  <a:srgbClr val="00B050"/>
+                </a:solidFill>
+              </a:rPr>
               <a:t>mz</a:t>
             </a:r>
             <a:r>
-              <a:rPr lang="en-US" dirty="0" smtClean="0"/>
+              <a:rPr lang="en-US" dirty="0" smtClean="0">
+                <a:solidFill>
+                  <a:srgbClr val="00B050"/>
+                </a:solidFill>
+              </a:rPr>
               <a:t> (do not list of all values are zero)</a:t>
             </a:r>
           </a:p>
           <a:p>
             <a:pPr lvl="1"/>
             <a:r>
-              <a:rPr lang="en-US" dirty="0" err="1" smtClean="0"/>
+              <a:rPr lang="en-US" dirty="0" err="1" smtClean="0">
+                <a:solidFill>
+                  <a:srgbClr val="FF0000"/>
+                </a:solidFill>
+              </a:rPr>
               <a:t>lc</a:t>
             </a:r>
             <a:r>
-              <a:rPr lang="en-US" dirty="0" smtClean="0"/>
-              <a:t>: the result of c1*ilc1 + c2*ilc2 + …</a:t>
+              <a:rPr lang="en-US" dirty="0" smtClean="0">
+                <a:solidFill>
+                  <a:srgbClr val="FF0000"/>
+                </a:solidFill>
+              </a:rPr>
+              <a:t>: the result of c1*ilc1 + c2*ilc2 + </a:t>
+            </a:r>
+            <a:r>
+              <a:rPr lang="en-US" dirty="0" smtClean="0">
+                <a:solidFill>
+                  <a:srgbClr val="FF0000"/>
+                </a:solidFill>
+              </a:rPr>
+              <a:t>…</a:t>
             </a:r>
           </a:p>
           <a:p>
             <a:pPr lvl="1">
               <a:buNone/>
             </a:pPr>
-            <a:endParaRPr lang="en-US" dirty="0" smtClean="0"/>
+            <a:r>
+              <a:rPr lang="en-US" sz="2000" dirty="0" smtClean="0">
+                <a:solidFill>
+                  <a:srgbClr val="FF0000"/>
+                </a:solidFill>
+              </a:rPr>
+              <a:t>As I understand, (c1, c2, …) are obtained in </a:t>
+            </a:r>
+            <a:r>
+              <a:rPr lang="en-US" sz="2000" dirty="0" err="1" smtClean="0">
+                <a:solidFill>
+                  <a:srgbClr val="FF0000"/>
+                </a:solidFill>
+              </a:rPr>
+              <a:t>ba_lcs</a:t>
+            </a:r>
+            <a:r>
+              <a:rPr lang="en-US" sz="2000" dirty="0" smtClean="0">
+                <a:solidFill>
+                  <a:srgbClr val="FF0000"/>
+                </a:solidFill>
+              </a:rPr>
+              <a:t> table, however, there are generated </a:t>
+            </a:r>
+            <a:r>
+              <a:rPr lang="en-US" sz="2000" dirty="0" err="1" smtClean="0">
+                <a:solidFill>
+                  <a:srgbClr val="FF0000"/>
+                </a:solidFill>
+              </a:rPr>
+              <a:t>ilc</a:t>
+            </a:r>
+            <a:r>
+              <a:rPr lang="en-US" sz="2000" dirty="0" smtClean="0">
+                <a:solidFill>
+                  <a:srgbClr val="FF0000"/>
+                </a:solidFill>
+              </a:rPr>
+              <a:t> after the mesh as well (each </a:t>
+            </a:r>
+            <a:r>
+              <a:rPr lang="en-US" sz="2000" dirty="0" err="1" smtClean="0">
+                <a:solidFill>
+                  <a:srgbClr val="FF0000"/>
+                </a:solidFill>
+              </a:rPr>
+              <a:t>ilc</a:t>
+            </a:r>
+            <a:r>
+              <a:rPr lang="en-US" sz="2000" dirty="0" smtClean="0">
+                <a:solidFill>
+                  <a:srgbClr val="FF0000"/>
+                </a:solidFill>
+              </a:rPr>
+              <a:t> is the loading data of 2 nodes, and if there are generated nodes, there will be generated </a:t>
+            </a:r>
+            <a:r>
+              <a:rPr lang="en-US" sz="2000" dirty="0" err="1" smtClean="0">
+                <a:solidFill>
+                  <a:srgbClr val="FF0000"/>
+                </a:solidFill>
+              </a:rPr>
+              <a:t>ilcs</a:t>
+            </a:r>
+            <a:r>
+              <a:rPr lang="en-US" sz="2000" dirty="0" smtClean="0">
+                <a:solidFill>
+                  <a:srgbClr val="FF0000"/>
+                </a:solidFill>
+              </a:rPr>
+              <a:t>), so which coefficient will be used for those generated </a:t>
+            </a:r>
+            <a:r>
+              <a:rPr lang="en-US" sz="2000" dirty="0" err="1" smtClean="0">
+                <a:solidFill>
+                  <a:srgbClr val="FF0000"/>
+                </a:solidFill>
+              </a:rPr>
+              <a:t>ilc</a:t>
+            </a:r>
+            <a:r>
+              <a:rPr lang="en-US" sz="2000" dirty="0" smtClean="0">
+                <a:solidFill>
+                  <a:srgbClr val="FF0000"/>
+                </a:solidFill>
+              </a:rPr>
+              <a:t>?</a:t>
+            </a:r>
+            <a:endParaRPr lang="en-US" sz="2000" dirty="0" smtClean="0">
+              <a:solidFill>
+                <a:srgbClr val="FF0000"/>
+              </a:solidFill>
+            </a:endParaRPr>
           </a:p>
           <a:p>
             <a:pPr lvl="1">
               <a:buNone/>
             </a:pPr>
             <a:r>
-              <a:rPr lang="en-US" dirty="0" smtClean="0"/>
-              <a:t>These data can be in one </a:t>
-            </a:r>
-            <a:r>
-              <a:rPr lang="en-US" dirty="0" err="1" smtClean="0"/>
+              <a:rPr lang="en-US" dirty="0" smtClean="0">
+                <a:solidFill>
+                  <a:srgbClr val="00B050"/>
+                </a:solidFill>
+              </a:rPr>
+              <a:t>These </a:t>
+            </a:r>
+            <a:r>
+              <a:rPr lang="en-US" dirty="0" smtClean="0">
+                <a:solidFill>
+                  <a:srgbClr val="00B050"/>
+                </a:solidFill>
+              </a:rPr>
+              <a:t>data can be in one </a:t>
+            </a:r>
+            <a:r>
+              <a:rPr lang="en-US" dirty="0" err="1" smtClean="0">
+                <a:solidFill>
+                  <a:srgbClr val="00B050"/>
+                </a:solidFill>
+              </a:rPr>
               <a:t>jason</a:t>
             </a:r>
             <a:r>
-              <a:rPr lang="en-US" dirty="0" smtClean="0"/>
+              <a:rPr lang="en-US" dirty="0" smtClean="0">
+                <a:solidFill>
+                  <a:srgbClr val="00B050"/>
+                </a:solidFill>
+              </a:rPr>
               <a:t> file: </a:t>
             </a:r>
             <a:r>
-              <a:rPr lang="en-US" dirty="0" err="1" smtClean="0"/>
+              <a:rPr lang="en-US" dirty="0" err="1" smtClean="0">
+                <a:solidFill>
+                  <a:srgbClr val="00B050"/>
+                </a:solidFill>
+              </a:rPr>
               <a:t>model.json</a:t>
             </a:r>
-            <a:endParaRPr lang="en-US" dirty="0" smtClean="0"/>
+            <a:endParaRPr lang="en-US" dirty="0" smtClean="0">
+              <a:solidFill>
+                <a:srgbClr val="00B050"/>
+              </a:solidFill>
+            </a:endParaRPr>
           </a:p>
         </p:txBody>
       </p:sp>
@@ -4191,51 +4783,99 @@
               <a:t>, </a:t>
             </a:r>
             <a:r>
-              <a:rPr lang="en-US" dirty="0" err="1" smtClean="0"/>
+              <a:rPr lang="en-US" dirty="0" err="1" smtClean="0">
+                <a:solidFill>
+                  <a:srgbClr val="FF0000"/>
+                </a:solidFill>
+              </a:rPr>
               <a:t>rx</a:t>
             </a:r>
             <a:r>
-              <a:rPr lang="en-US" dirty="0" smtClean="0"/>
+              <a:rPr lang="en-US" dirty="0" smtClean="0">
+                <a:solidFill>
+                  <a:srgbClr val="FF0000"/>
+                </a:solidFill>
+              </a:rPr>
               <a:t>, </a:t>
             </a:r>
             <a:r>
-              <a:rPr lang="en-US" dirty="0" err="1" smtClean="0"/>
+              <a:rPr lang="en-US" dirty="0" err="1" smtClean="0">
+                <a:solidFill>
+                  <a:srgbClr val="FF0000"/>
+                </a:solidFill>
+              </a:rPr>
               <a:t>ry</a:t>
             </a:r>
             <a:r>
-              <a:rPr lang="en-US" dirty="0" smtClean="0"/>
+              <a:rPr lang="en-US" dirty="0" smtClean="0">
+                <a:solidFill>
+                  <a:srgbClr val="FF0000"/>
+                </a:solidFill>
+              </a:rPr>
               <a:t>, </a:t>
             </a:r>
             <a:r>
-              <a:rPr lang="en-US" dirty="0" err="1" smtClean="0"/>
+              <a:rPr lang="en-US" dirty="0" err="1" smtClean="0">
+                <a:solidFill>
+                  <a:srgbClr val="FF0000"/>
+                </a:solidFill>
+              </a:rPr>
               <a:t>rz</a:t>
             </a:r>
             <a:r>
-              <a:rPr lang="en-US" dirty="0" smtClean="0"/>
+              <a:rPr lang="en-US" dirty="0" smtClean="0">
+                <a:solidFill>
+                  <a:srgbClr val="FF0000"/>
+                </a:solidFill>
+              </a:rPr>
               <a:t>, </a:t>
             </a:r>
             <a:r>
-              <a:rPr lang="en-US" dirty="0" err="1" smtClean="0"/>
+              <a:rPr lang="en-US" dirty="0" err="1" smtClean="0">
+                <a:solidFill>
+                  <a:srgbClr val="FF0000"/>
+                </a:solidFill>
+              </a:rPr>
               <a:t>qx</a:t>
             </a:r>
             <a:r>
-              <a:rPr lang="en-US" dirty="0" smtClean="0"/>
+              <a:rPr lang="en-US" dirty="0" smtClean="0">
+                <a:solidFill>
+                  <a:srgbClr val="FF0000"/>
+                </a:solidFill>
+              </a:rPr>
               <a:t>, </a:t>
             </a:r>
             <a:r>
-              <a:rPr lang="en-US" dirty="0" err="1" smtClean="0"/>
+              <a:rPr lang="en-US" dirty="0" err="1" smtClean="0">
+                <a:solidFill>
+                  <a:srgbClr val="FF0000"/>
+                </a:solidFill>
+              </a:rPr>
               <a:t>qy</a:t>
             </a:r>
             <a:r>
-              <a:rPr lang="en-US" dirty="0" smtClean="0"/>
+              <a:rPr lang="en-US" dirty="0" smtClean="0">
+                <a:solidFill>
+                  <a:srgbClr val="FF0000"/>
+                </a:solidFill>
+              </a:rPr>
               <a:t>, </a:t>
             </a:r>
             <a:r>
-              <a:rPr lang="en-US" dirty="0" err="1" smtClean="0"/>
+              <a:rPr lang="en-US" dirty="0" err="1" smtClean="0">
+                <a:solidFill>
+                  <a:srgbClr val="FF0000"/>
+                </a:solidFill>
+              </a:rPr>
               <a:t>qz</a:t>
             </a:r>
             <a:r>
-              <a:rPr lang="en-US" dirty="0" smtClean="0"/>
+              <a:rPr lang="en-US" dirty="0" smtClean="0">
+                <a:solidFill>
+                  <a:srgbClr val="FF0000"/>
+                </a:solidFill>
+              </a:rPr>
               <a:t>, </a:t>
             </a:r>
             <a:r>
@@ -4257,50 +4897,162 @@
               <a:buNone/>
             </a:pPr>
             <a:r>
+              <a:rPr lang="en-US" sz="2000" dirty="0" smtClean="0">
+                <a:solidFill>
+                  <a:srgbClr val="FF0000"/>
+                </a:solidFill>
+              </a:rPr>
+              <a:t>I am unable to see where the attributes above are located</a:t>
+            </a:r>
+            <a:endParaRPr lang="en-US" sz="2000" dirty="0" smtClean="0">
+              <a:solidFill>
+                <a:srgbClr val="FF0000"/>
+              </a:solidFill>
+            </a:endParaRPr>
+          </a:p>
+          <a:p>
+            <a:pPr>
+              <a:buNone/>
+            </a:pPr>
+            <a:r>
               <a:rPr lang="en-US" dirty="0" smtClean="0"/>
-              <a:t>	When giving </a:t>
-            </a:r>
-            <a:r>
-              <a:rPr lang="en-US" dirty="0" err="1" smtClean="0"/>
+              <a:t>	</a:t>
+            </a:r>
+            <a:r>
+              <a:rPr lang="en-US" dirty="0" smtClean="0">
+                <a:solidFill>
+                  <a:srgbClr val="0070C0"/>
+                </a:solidFill>
+              </a:rPr>
+              <a:t>When giving </a:t>
+            </a:r>
+            <a:r>
+              <a:rPr lang="en-US" dirty="0" err="1" smtClean="0">
+                <a:solidFill>
+                  <a:srgbClr val="0070C0"/>
+                </a:solidFill>
+              </a:rPr>
               <a:t>ilc</a:t>
             </a:r>
             <a:r>
-              <a:rPr lang="en-US" dirty="0" smtClean="0"/>
+              <a:rPr lang="en-US" dirty="0" smtClean="0">
+                <a:solidFill>
+                  <a:srgbClr val="0070C0"/>
+                </a:solidFill>
+              </a:rPr>
               <a:t> or </a:t>
             </a:r>
             <a:r>
-              <a:rPr lang="en-US" dirty="0" err="1" smtClean="0"/>
+              <a:rPr lang="en-US" dirty="0" err="1" smtClean="0">
+                <a:solidFill>
+                  <a:srgbClr val="0070C0"/>
+                </a:solidFill>
+              </a:rPr>
               <a:t>lc</a:t>
             </a:r>
             <a:r>
-              <a:rPr lang="en-US" dirty="0" smtClean="0"/>
+              <a:rPr lang="en-US" dirty="0" smtClean="0">
+                <a:solidFill>
+                  <a:srgbClr val="0070C0"/>
+                </a:solidFill>
+              </a:rPr>
               <a:t>, the corresponding data for that </a:t>
             </a:r>
             <a:r>
-              <a:rPr lang="en-US" dirty="0" err="1" smtClean="0"/>
+              <a:rPr lang="en-US" dirty="0" err="1" smtClean="0">
+                <a:solidFill>
+                  <a:srgbClr val="0070C0"/>
+                </a:solidFill>
+              </a:rPr>
               <a:t>ilc</a:t>
             </a:r>
             <a:r>
-              <a:rPr lang="en-US" dirty="0" smtClean="0"/>
+              <a:rPr lang="en-US" dirty="0" smtClean="0">
+                <a:solidFill>
+                  <a:srgbClr val="0070C0"/>
+                </a:solidFill>
+              </a:rPr>
               <a:t> or </a:t>
             </a:r>
             <a:r>
-              <a:rPr lang="en-US" dirty="0" err="1" smtClean="0"/>
+              <a:rPr lang="en-US" dirty="0" err="1" smtClean="0">
+                <a:solidFill>
+                  <a:srgbClr val="0070C0"/>
+                </a:solidFill>
+              </a:rPr>
               <a:t>lc</a:t>
             </a:r>
             <a:r>
-              <a:rPr lang="en-US" dirty="0" smtClean="0"/>
+              <a:rPr lang="en-US" dirty="0" smtClean="0">
+                <a:solidFill>
+                  <a:srgbClr val="0070C0"/>
+                </a:solidFill>
+              </a:rPr>
               <a:t> in the </a:t>
             </a:r>
             <a:r>
-              <a:rPr lang="en-US" dirty="0" err="1" smtClean="0"/>
+              <a:rPr lang="en-US" dirty="0" err="1" smtClean="0">
+                <a:solidFill>
+                  <a:srgbClr val="0070C0"/>
+                </a:solidFill>
+              </a:rPr>
               <a:t>json</a:t>
             </a:r>
             <a:r>
-              <a:rPr lang="en-US" dirty="0" smtClean="0"/>
-              <a:t> file should be able to be retrieved and returned to a variable. </a:t>
-            </a:r>
-            <a:endParaRPr lang="en-US" dirty="0"/>
+              <a:rPr lang="en-US" dirty="0" smtClean="0">
+                <a:solidFill>
+                  <a:srgbClr val="0070C0"/>
+                </a:solidFill>
+              </a:rPr>
+              <a:t> file should be able to be </a:t>
+            </a:r>
+            <a:r>
+              <a:rPr lang="en-US" dirty="0" smtClean="0">
+                <a:solidFill>
+                  <a:srgbClr val="0070C0"/>
+                </a:solidFill>
+              </a:rPr>
+              <a:t>retrieved </a:t>
+            </a:r>
+            <a:r>
+              <a:rPr lang="en-US" dirty="0" smtClean="0">
+                <a:solidFill>
+                  <a:srgbClr val="0070C0"/>
+                </a:solidFill>
+              </a:rPr>
+              <a:t>and returned to a variable. </a:t>
+            </a:r>
+            <a:endParaRPr lang="en-US" dirty="0" smtClean="0">
+              <a:solidFill>
+                <a:srgbClr val="0070C0"/>
+              </a:solidFill>
+            </a:endParaRPr>
+          </a:p>
+          <a:p>
+            <a:pPr>
+              <a:buNone/>
+            </a:pPr>
+            <a:r>
+              <a:rPr lang="en-US" sz="2000" dirty="0" smtClean="0">
+                <a:solidFill>
+                  <a:srgbClr val="0070C0"/>
+                </a:solidFill>
+              </a:rPr>
+              <a:t>This will be done after we sort out </a:t>
+            </a:r>
+            <a:r>
+              <a:rPr lang="en-US" sz="2000" smtClean="0">
+                <a:solidFill>
+                  <a:srgbClr val="0070C0"/>
+                </a:solidFill>
+              </a:rPr>
+              <a:t>the calculations.</a:t>
+            </a:r>
+            <a:endParaRPr lang="en-US" sz="2000" dirty="0">
+              <a:solidFill>
+                <a:srgbClr val="0070C0"/>
+              </a:solidFill>
+            </a:endParaRPr>
           </a:p>
         </p:txBody>
       </p:sp>

</xml_diff>